<commit_message>
editando o slide sprint1
</commit_message>
<xml_diff>
--- a/docs/Apresentação/Sprint_1.pptx
+++ b/docs/Apresentação/Sprint_1.pptx
@@ -16,10 +16,11 @@
     <p:sldId id="267" r:id="rId10"/>
     <p:sldId id="268" r:id="rId11"/>
     <p:sldId id="261" r:id="rId12"/>
-    <p:sldId id="269" r:id="rId13"/>
-    <p:sldId id="266" r:id="rId14"/>
-    <p:sldId id="264" r:id="rId15"/>
-    <p:sldId id="270" r:id="rId16"/>
+    <p:sldId id="271" r:id="rId13"/>
+    <p:sldId id="269" r:id="rId14"/>
+    <p:sldId id="266" r:id="rId15"/>
+    <p:sldId id="264" r:id="rId16"/>
+    <p:sldId id="270" r:id="rId17"/>
   </p:sldIdLst>
   <p:sldSz cx="12192000" cy="6858000"/>
   <p:notesSz cx="6858000" cy="9144000"/>
@@ -3075,7 +3076,7 @@
             <a:fld id="{B61BEF0D-F0BB-DE4B-95CE-6DB70DBA9567}" type="datetimeFigureOut">
               <a:rPr lang="en-US" dirty="0"/>
               <a:pPr/>
-              <a:t>9/17/2022</a:t>
+              <a:t>9/18/2022</a:t>
             </a:fld>
             <a:endParaRPr lang="en-US" dirty="0"/>
           </a:p>
@@ -3327,7 +3328,7 @@
             <a:fld id="{B61BEF0D-F0BB-DE4B-95CE-6DB70DBA9567}" type="datetimeFigureOut">
               <a:rPr lang="en-US" dirty="0"/>
               <a:pPr/>
-              <a:t>9/17/2022</a:t>
+              <a:t>9/18/2022</a:t>
             </a:fld>
             <a:endParaRPr lang="en-US" dirty="0"/>
           </a:p>
@@ -3642,7 +3643,7 @@
             <a:fld id="{B61BEF0D-F0BB-DE4B-95CE-6DB70DBA9567}" type="datetimeFigureOut">
               <a:rPr lang="en-US" dirty="0"/>
               <a:pPr/>
-              <a:t>9/17/2022</a:t>
+              <a:t>9/18/2022</a:t>
             </a:fld>
             <a:endParaRPr lang="en-US" dirty="0"/>
           </a:p>
@@ -3984,7 +3985,7 @@
             <a:fld id="{B61BEF0D-F0BB-DE4B-95CE-6DB70DBA9567}" type="datetimeFigureOut">
               <a:rPr lang="en-US" dirty="0"/>
               <a:pPr/>
-              <a:t>9/17/2022</a:t>
+              <a:t>9/18/2022</a:t>
             </a:fld>
             <a:endParaRPr lang="en-US" dirty="0"/>
           </a:p>
@@ -4299,7 +4300,7 @@
             <a:fld id="{B61BEF0D-F0BB-DE4B-95CE-6DB70DBA9567}" type="datetimeFigureOut">
               <a:rPr lang="en-US" dirty="0"/>
               <a:pPr/>
-              <a:t>9/17/2022</a:t>
+              <a:t>9/18/2022</a:t>
             </a:fld>
             <a:endParaRPr lang="en-US" dirty="0"/>
           </a:p>
@@ -4693,7 +4694,7 @@
             <a:fld id="{B61BEF0D-F0BB-DE4B-95CE-6DB70DBA9567}" type="datetimeFigureOut">
               <a:rPr lang="en-US" dirty="0"/>
               <a:pPr/>
-              <a:t>9/17/2022</a:t>
+              <a:t>9/18/2022</a:t>
             </a:fld>
             <a:endParaRPr lang="en-US" dirty="0"/>
           </a:p>
@@ -4862,7 +4863,7 @@
           <a:p>
             <a:fld id="{55C6B4A9-1611-4792-9094-5F34BCA07E0B}" type="datetimeFigureOut">
               <a:rPr lang="en-US" dirty="0"/>
-              <a:t>9/17/2022</a:t>
+              <a:t>9/18/2022</a:t>
             </a:fld>
             <a:endParaRPr lang="en-US" dirty="0"/>
           </a:p>
@@ -5041,7 +5042,7 @@
             <a:fld id="{B61BEF0D-F0BB-DE4B-95CE-6DB70DBA9567}" type="datetimeFigureOut">
               <a:rPr lang="en-US" dirty="0"/>
               <a:pPr/>
-              <a:t>9/17/2022</a:t>
+              <a:t>9/18/2022</a:t>
             </a:fld>
             <a:endParaRPr lang="en-US" dirty="0"/>
           </a:p>
@@ -5217,7 +5218,7 @@
             <a:fld id="{B61BEF0D-F0BB-DE4B-95CE-6DB70DBA9567}" type="datetimeFigureOut">
               <a:rPr lang="en-US" dirty="0"/>
               <a:pPr/>
-              <a:t>9/17/2022</a:t>
+              <a:t>9/18/2022</a:t>
             </a:fld>
             <a:endParaRPr lang="en-US" dirty="0"/>
           </a:p>
@@ -5465,7 +5466,7 @@
             <a:fld id="{B61BEF0D-F0BB-DE4B-95CE-6DB70DBA9567}" type="datetimeFigureOut">
               <a:rPr lang="en-US" dirty="0"/>
               <a:pPr/>
-              <a:t>9/17/2022</a:t>
+              <a:t>9/18/2022</a:t>
             </a:fld>
             <a:endParaRPr lang="en-US" dirty="0"/>
           </a:p>
@@ -5695,7 +5696,7 @@
           <a:p>
             <a:fld id="{EB712588-04B1-427B-82EE-E8DB90309F08}" type="datetimeFigureOut">
               <a:rPr lang="en-US" dirty="0"/>
-              <a:t>9/17/2022</a:t>
+              <a:t>9/18/2022</a:t>
             </a:fld>
             <a:endParaRPr lang="en-US" dirty="0"/>
           </a:p>
@@ -6067,7 +6068,7 @@
             <a:fld id="{B61BEF0D-F0BB-DE4B-95CE-6DB70DBA9567}" type="datetimeFigureOut">
               <a:rPr lang="en-US" dirty="0"/>
               <a:pPr/>
-              <a:t>9/17/2022</a:t>
+              <a:t>9/18/2022</a:t>
             </a:fld>
             <a:endParaRPr lang="en-US" dirty="0"/>
           </a:p>
@@ -6191,7 +6192,7 @@
             <a:fld id="{B61BEF0D-F0BB-DE4B-95CE-6DB70DBA9567}" type="datetimeFigureOut">
               <a:rPr lang="en-US" dirty="0"/>
               <a:pPr/>
-              <a:t>9/17/2022</a:t>
+              <a:t>9/18/2022</a:t>
             </a:fld>
             <a:endParaRPr lang="en-US" dirty="0"/>
           </a:p>
@@ -6288,7 +6289,7 @@
             <a:fld id="{B61BEF0D-F0BB-DE4B-95CE-6DB70DBA9567}" type="datetimeFigureOut">
               <a:rPr lang="en-US" dirty="0"/>
               <a:pPr/>
-              <a:t>9/17/2022</a:t>
+              <a:t>9/18/2022</a:t>
             </a:fld>
             <a:endParaRPr lang="en-US" dirty="0"/>
           </a:p>
@@ -6542,7 +6543,7 @@
           <a:p>
             <a:fld id="{42A54C80-263E-416B-A8E0-580EDEADCBDC}" type="datetimeFigureOut">
               <a:rPr lang="en-US" dirty="0"/>
-              <a:t>9/17/2022</a:t>
+              <a:t>9/18/2022</a:t>
             </a:fld>
             <a:endParaRPr lang="en-US" dirty="0"/>
           </a:p>
@@ -6801,7 +6802,7 @@
             <a:fld id="{B61BEF0D-F0BB-DE4B-95CE-6DB70DBA9567}" type="datetimeFigureOut">
               <a:rPr lang="en-US" dirty="0"/>
               <a:pPr/>
-              <a:t>9/17/2022</a:t>
+              <a:t>9/18/2022</a:t>
             </a:fld>
             <a:endParaRPr lang="en-US" dirty="0"/>
           </a:p>
@@ -7544,7 +7545,7 @@
             <a:fld id="{B61BEF0D-F0BB-DE4B-95CE-6DB70DBA9567}" type="datetimeFigureOut">
               <a:rPr lang="en-US" dirty="0"/>
               <a:pPr/>
-              <a:t>9/17/2022</a:t>
+              <a:t>9/18/2022</a:t>
             </a:fld>
             <a:endParaRPr lang="en-US" dirty="0"/>
           </a:p>
@@ -8520,18 +8521,18 @@
           <a:lstStyle/>
           <a:p>
             <a:r>
-              <a:rPr lang="pt-BR" dirty="0" err="1"/>
-              <a:t>Mock-ups</a:t>
+              <a:rPr lang="pt-BR" dirty="0"/>
+              <a:t>Teste</a:t>
             </a:r>
           </a:p>
         </p:txBody>
       </p:sp>
       <p:pic>
         <p:nvPicPr>
-          <p:cNvPr id="4" name="Imagem 4" descr="Interface gráfica do usuário, Aplicativo&#10;&#10;Descrição gerada automaticamente">
+          <p:cNvPr id="3" name="Imagem 2" descr="Forma&#10;&#10;Descrição gerada automaticamente">
             <a:extLst>
               <a:ext uri="{FF2B5EF4-FFF2-40B4-BE49-F238E27FC236}">
-                <a16:creationId xmlns:a16="http://schemas.microsoft.com/office/drawing/2014/main" id="{72070985-C85F-9DE4-2DB3-F1D4300970FE}"/>
+                <a16:creationId xmlns:a16="http://schemas.microsoft.com/office/drawing/2014/main" id="{2A79636C-64B9-D6CE-5BB5-A01710C2C5A6}"/>
               </a:ext>
             </a:extLst>
           </p:cNvPr>
@@ -8541,15 +8542,21 @@
           <p:nvPr/>
         </p:nvPicPr>
         <p:blipFill>
-          <a:blip r:embed="rId2"/>
+          <a:blip r:embed="rId2">
+            <a:extLst>
+              <a:ext uri="{28A0092B-C50C-407E-A947-70E740481C1C}">
+                <a14:useLocalDpi xmlns:a14="http://schemas.microsoft.com/office/drawing/2010/main" val="0"/>
+              </a:ext>
+            </a:extLst>
+          </a:blip>
           <a:stretch>
             <a:fillRect/>
           </a:stretch>
         </p:blipFill>
         <p:spPr>
           <a:xfrm>
-            <a:off x="3799324" y="609600"/>
-            <a:ext cx="2715566" cy="5870121"/>
+            <a:off x="10896600" y="5605160"/>
+            <a:ext cx="1295400" cy="1252840"/>
           </a:xfrm>
           <a:prstGeom prst="rect">
             <a:avLst/>
@@ -8558,10 +8565,10 @@
       </p:pic>
       <p:pic>
         <p:nvPicPr>
-          <p:cNvPr id="3" name="Imagem 2" descr="Forma&#10;&#10;Descrição gerada automaticamente">
+          <p:cNvPr id="6" name="Imagem 5" descr="Interface gráfica do usuário, Aplicativo&#10;&#10;Descrição gerada automaticamente com confiança média">
             <a:extLst>
               <a:ext uri="{FF2B5EF4-FFF2-40B4-BE49-F238E27FC236}">
-                <a16:creationId xmlns:a16="http://schemas.microsoft.com/office/drawing/2014/main" id="{2A79636C-64B9-D6CE-5BB5-A01710C2C5A6}"/>
+                <a16:creationId xmlns:a16="http://schemas.microsoft.com/office/drawing/2014/main" id="{EF1E32D7-F46A-10D9-369C-7699FF8A7FF9}"/>
               </a:ext>
             </a:extLst>
           </p:cNvPr>
@@ -8584,8 +8591,8 @@
         </p:blipFill>
         <p:spPr>
           <a:xfrm>
-            <a:off x="10896600" y="5605160"/>
-            <a:ext cx="1295400" cy="1252840"/>
+            <a:off x="313944" y="1426225"/>
+            <a:ext cx="9230186" cy="4486895"/>
           </a:xfrm>
           <a:prstGeom prst="rect">
             <a:avLst/>
@@ -8606,6 +8613,136 @@
 </file>
 
 <file path=ppt/slides/slide12.xml><?xml version="1.0" encoding="utf-8"?>
+<p:sld xmlns:a="http://schemas.openxmlformats.org/drawingml/2006/main" xmlns:r="http://schemas.openxmlformats.org/officeDocument/2006/relationships" xmlns:p="http://schemas.openxmlformats.org/presentationml/2006/main">
+  <p:cSld>
+    <p:spTree>
+      <p:nvGrpSpPr>
+        <p:cNvPr id="1" name=""/>
+        <p:cNvGrpSpPr/>
+        <p:nvPr/>
+      </p:nvGrpSpPr>
+      <p:grpSpPr>
+        <a:xfrm>
+          <a:off x="0" y="0"/>
+          <a:ext cx="0" cy="0"/>
+          <a:chOff x="0" y="0"/>
+          <a:chExt cx="0" cy="0"/>
+        </a:xfrm>
+      </p:grpSpPr>
+      <p:sp>
+        <p:nvSpPr>
+          <p:cNvPr id="2" name="Título 1">
+            <a:extLst>
+              <a:ext uri="{FF2B5EF4-FFF2-40B4-BE49-F238E27FC236}">
+                <a16:creationId xmlns:a16="http://schemas.microsoft.com/office/drawing/2014/main" id="{365CC32E-F14A-7B03-0B0E-A4F00BDA16B0}"/>
+              </a:ext>
+            </a:extLst>
+          </p:cNvPr>
+          <p:cNvSpPr>
+            <a:spLocks noGrp="1"/>
+          </p:cNvSpPr>
+          <p:nvPr>
+            <p:ph type="title"/>
+          </p:nvPr>
+        </p:nvSpPr>
+        <p:spPr/>
+        <p:txBody>
+          <a:bodyPr/>
+          <a:lstStyle/>
+          <a:p>
+            <a:r>
+              <a:rPr lang="pt-BR" dirty="0"/>
+              <a:t>Validação</a:t>
+            </a:r>
+          </a:p>
+        </p:txBody>
+      </p:sp>
+      <p:pic>
+        <p:nvPicPr>
+          <p:cNvPr id="3" name="Imagem 2" descr="Forma&#10;&#10;Descrição gerada automaticamente">
+            <a:extLst>
+              <a:ext uri="{FF2B5EF4-FFF2-40B4-BE49-F238E27FC236}">
+                <a16:creationId xmlns:a16="http://schemas.microsoft.com/office/drawing/2014/main" id="{2A79636C-64B9-D6CE-5BB5-A01710C2C5A6}"/>
+              </a:ext>
+            </a:extLst>
+          </p:cNvPr>
+          <p:cNvPicPr>
+            <a:picLocks noChangeAspect="1"/>
+          </p:cNvPicPr>
+          <p:nvPr/>
+        </p:nvPicPr>
+        <p:blipFill>
+          <a:blip r:embed="rId2">
+            <a:extLst>
+              <a:ext uri="{28A0092B-C50C-407E-A947-70E740481C1C}">
+                <a14:useLocalDpi xmlns:a14="http://schemas.microsoft.com/office/drawing/2010/main" val="0"/>
+              </a:ext>
+            </a:extLst>
+          </a:blip>
+          <a:stretch>
+            <a:fillRect/>
+          </a:stretch>
+        </p:blipFill>
+        <p:spPr>
+          <a:xfrm>
+            <a:off x="10896600" y="5605160"/>
+            <a:ext cx="1295400" cy="1252840"/>
+          </a:xfrm>
+          <a:prstGeom prst="rect">
+            <a:avLst/>
+          </a:prstGeom>
+        </p:spPr>
+      </p:pic>
+      <p:pic>
+        <p:nvPicPr>
+          <p:cNvPr id="5" name="Imagem 4" descr="Interface gráfica do usuário, Aplicativo&#10;&#10;Descrição gerada automaticamente com confiança média">
+            <a:extLst>
+              <a:ext uri="{FF2B5EF4-FFF2-40B4-BE49-F238E27FC236}">
+                <a16:creationId xmlns:a16="http://schemas.microsoft.com/office/drawing/2014/main" id="{D7D6C554-060C-B465-4B0F-82F3201C44AB}"/>
+              </a:ext>
+            </a:extLst>
+          </p:cNvPr>
+          <p:cNvPicPr>
+            <a:picLocks noChangeAspect="1"/>
+          </p:cNvPicPr>
+          <p:nvPr/>
+        </p:nvPicPr>
+        <p:blipFill>
+          <a:blip r:embed="rId3">
+            <a:extLst>
+              <a:ext uri="{28A0092B-C50C-407E-A947-70E740481C1C}">
+                <a14:useLocalDpi xmlns:a14="http://schemas.microsoft.com/office/drawing/2010/main" val="0"/>
+              </a:ext>
+            </a:extLst>
+          </a:blip>
+          <a:stretch>
+            <a:fillRect/>
+          </a:stretch>
+        </p:blipFill>
+        <p:spPr>
+          <a:xfrm>
+            <a:off x="274320" y="1559868"/>
+            <a:ext cx="9213042" cy="4269922"/>
+          </a:xfrm>
+          <a:prstGeom prst="rect">
+            <a:avLst/>
+          </a:prstGeom>
+        </p:spPr>
+      </p:pic>
+    </p:spTree>
+    <p:extLst>
+      <p:ext uri="{BB962C8B-B14F-4D97-AF65-F5344CB8AC3E}">
+        <p14:creationId xmlns:p14="http://schemas.microsoft.com/office/powerpoint/2010/main" val="1992816877"/>
+      </p:ext>
+    </p:extLst>
+  </p:cSld>
+  <p:clrMapOvr>
+    <a:masterClrMapping/>
+  </p:clrMapOvr>
+</p:sld>
+</file>
+
+<file path=ppt/slides/slide13.xml><?xml version="1.0" encoding="utf-8"?>
 <p:sld xmlns:a="http://schemas.openxmlformats.org/drawingml/2006/main" xmlns:r="http://schemas.openxmlformats.org/officeDocument/2006/relationships" xmlns:p="http://schemas.openxmlformats.org/presentationml/2006/main">
   <p:cSld>
     <p:spTree>
@@ -8746,7 +8883,7 @@
 </p:sld>
 </file>
 
-<file path=ppt/slides/slide13.xml><?xml version="1.0" encoding="utf-8"?>
+<file path=ppt/slides/slide14.xml><?xml version="1.0" encoding="utf-8"?>
 <p:sld xmlns:a="http://schemas.openxmlformats.org/drawingml/2006/main" xmlns:r="http://schemas.openxmlformats.org/officeDocument/2006/relationships" xmlns:p="http://schemas.openxmlformats.org/presentationml/2006/main">
   <p:cSld>
     <p:spTree>
@@ -8785,12 +8922,8 @@
           <a:lstStyle/>
           <a:p>
             <a:r>
-              <a:rPr lang="pt-BR" dirty="0"/>
-              <a:t>Gráfico </a:t>
-            </a:r>
-            <a:r>
-              <a:rPr lang="pt-BR" dirty="0" err="1"/>
-              <a:t>Burndown</a:t>
+              <a:rPr lang="pt-BR"/>
+              <a:t>Gráfico Burndown</a:t>
             </a:r>
             <a:endParaRPr lang="pt-BR" dirty="0"/>
           </a:p>
@@ -8832,6 +8965,53 @@
           </a:prstGeom>
         </p:spPr>
       </p:pic>
+      <p:pic>
+        <p:nvPicPr>
+          <p:cNvPr id="1026" name="Picture 2">
+            <a:extLst>
+              <a:ext uri="{FF2B5EF4-FFF2-40B4-BE49-F238E27FC236}">
+                <a16:creationId xmlns:a16="http://schemas.microsoft.com/office/drawing/2014/main" id="{B221C502-3A2C-438E-5A3F-E65FA9C93E28}"/>
+              </a:ext>
+            </a:extLst>
+          </p:cNvPr>
+          <p:cNvPicPr>
+            <a:picLocks noChangeAspect="1" noChangeArrowheads="1"/>
+          </p:cNvPicPr>
+          <p:nvPr/>
+        </p:nvPicPr>
+        <p:blipFill>
+          <a:blip r:embed="rId3">
+            <a:extLst>
+              <a:ext uri="{28A0092B-C50C-407E-A947-70E740481C1C}">
+                <a14:useLocalDpi xmlns:a14="http://schemas.microsoft.com/office/drawing/2010/main" val="0"/>
+              </a:ext>
+            </a:extLst>
+          </a:blip>
+          <a:srcRect/>
+          <a:stretch>
+            <a:fillRect/>
+          </a:stretch>
+        </p:blipFill>
+        <p:spPr bwMode="auto">
+          <a:xfrm>
+            <a:off x="350520" y="1524455"/>
+            <a:ext cx="9274002" cy="4723945"/>
+          </a:xfrm>
+          <a:prstGeom prst="rect">
+            <a:avLst/>
+          </a:prstGeom>
+          <a:noFill/>
+          <a:extLst>
+            <a:ext uri="{909E8E84-426E-40DD-AFC4-6F175D3DCCD1}">
+              <a14:hiddenFill xmlns:a14="http://schemas.microsoft.com/office/drawing/2010/main">
+                <a:solidFill>
+                  <a:srgbClr val="FFFFFF"/>
+                </a:solidFill>
+              </a14:hiddenFill>
+            </a:ext>
+          </a:extLst>
+        </p:spPr>
+      </p:pic>
     </p:spTree>
     <p:extLst>
       <p:ext uri="{BB962C8B-B14F-4D97-AF65-F5344CB8AC3E}">
@@ -8845,7 +9025,7 @@
 </p:sld>
 </file>
 
-<file path=ppt/slides/slide14.xml><?xml version="1.0" encoding="utf-8"?>
+<file path=ppt/slides/slide15.xml><?xml version="1.0" encoding="utf-8"?>
 <p:sld xmlns:a="http://schemas.openxmlformats.org/drawingml/2006/main" xmlns:r="http://schemas.openxmlformats.org/officeDocument/2006/relationships" xmlns:p="http://schemas.openxmlformats.org/presentationml/2006/main">
   <p:cSld>
     <p:spTree>
@@ -9059,7 +9239,7 @@
 </p:sld>
 </file>
 
-<file path=ppt/slides/slide15.xml><?xml version="1.0" encoding="utf-8"?>
+<file path=ppt/slides/slide16.xml><?xml version="1.0" encoding="utf-8"?>
 <p:sld xmlns:a="http://schemas.openxmlformats.org/drawingml/2006/main" xmlns:r="http://schemas.openxmlformats.org/officeDocument/2006/relationships" xmlns:p="http://schemas.openxmlformats.org/presentationml/2006/main">
   <p:cSld>
     <p:bg>

</xml_diff>